<commit_message>
add bad-written not working code during exercises
</commit_message>
<xml_diff>
--- a/3 week - Materials/VRARXR-03. Exercises.pptx
+++ b/3 week - Materials/VRARXR-03. Exercises.pptx
@@ -2816,7 +2816,7 @@
           <p:nvPr>
             <p:extLst>
               <p:ext uri="{D42A27DB-BD31-4B8C-83A1-F6EECF244321}">
-                <p14:modId xmlns:p14="http://schemas.microsoft.com/office/powerpoint/2010/main" val="3795981203"/>
+                <p14:modId xmlns:p14="http://schemas.microsoft.com/office/powerpoint/2010/main" val="548170213"/>
               </p:ext>
             </p:extLst>
           </p:nvPr>
@@ -3082,12 +3082,15 @@
                     <a:bodyPr/>
                     <a:lstStyle/>
                     <a:p>
-                      <a:endParaRPr lang="bg-BG" sz="1600" dirty="0">
-                        <a:solidFill>
-                          <a:schemeClr val="tx1"/>
-                        </a:solidFill>
-                        <a:latin typeface="Arial Black" panose="020B0A04020102020204" pitchFamily="34" charset="0"/>
-                      </a:endParaRPr>
+                      <a:r>
+                        <a:rPr lang="bg-BG" sz="1600" dirty="0">
+                          <a:solidFill>
+                            <a:schemeClr val="tx1"/>
+                          </a:solidFill>
+                          <a:latin typeface="Arial Black" panose="020B0A04020102020204" pitchFamily="34" charset="0"/>
+                        </a:rPr>
+                        <a:t>2</a:t>
+                      </a:r>
                     </a:p>
                   </a:txBody>
                   <a:tcPr>
@@ -3135,12 +3138,15 @@
                     <a:bodyPr/>
                     <a:lstStyle/>
                     <a:p>
-                      <a:endParaRPr lang="bg-BG" sz="1600">
-                        <a:solidFill>
-                          <a:schemeClr val="tx1"/>
-                        </a:solidFill>
-                        <a:latin typeface="Arial Black" panose="020B0A04020102020204" pitchFamily="34" charset="0"/>
-                      </a:endParaRPr>
+                      <a:r>
+                        <a:rPr lang="bg-BG" sz="1600" dirty="0">
+                          <a:solidFill>
+                            <a:schemeClr val="tx1"/>
+                          </a:solidFill>
+                          <a:latin typeface="Arial Black" panose="020B0A04020102020204" pitchFamily="34" charset="0"/>
+                        </a:rPr>
+                        <a:t>3</a:t>
+                      </a:r>
                     </a:p>
                   </a:txBody>
                   <a:tcPr>
@@ -3244,12 +3250,15 @@
                     <a:bodyPr/>
                     <a:lstStyle/>
                     <a:p>
-                      <a:endParaRPr lang="bg-BG" sz="1600" dirty="0">
-                        <a:solidFill>
-                          <a:schemeClr val="tx1"/>
-                        </a:solidFill>
-                        <a:latin typeface="Arial Black" panose="020B0A04020102020204" pitchFamily="34" charset="0"/>
-                      </a:endParaRPr>
+                      <a:r>
+                        <a:rPr lang="bg-BG" sz="1600" dirty="0">
+                          <a:solidFill>
+                            <a:schemeClr val="tx1"/>
+                          </a:solidFill>
+                          <a:latin typeface="Arial Black" panose="020B0A04020102020204" pitchFamily="34" charset="0"/>
+                        </a:rPr>
+                        <a:t>6</a:t>
+                      </a:r>
                     </a:p>
                   </a:txBody>
                   <a:tcPr>
@@ -4131,12 +4140,15 @@
                     <a:bodyPr/>
                     <a:lstStyle/>
                     <a:p>
-                      <a:endParaRPr lang="bg-BG" sz="1600" dirty="0">
-                        <a:solidFill>
-                          <a:schemeClr val="tx1"/>
-                        </a:solidFill>
-                        <a:latin typeface="Arial Black" panose="020B0A04020102020204" pitchFamily="34" charset="0"/>
-                      </a:endParaRPr>
+                      <a:r>
+                        <a:rPr lang="bg-BG" sz="1600" dirty="0">
+                          <a:solidFill>
+                            <a:schemeClr val="tx1"/>
+                          </a:solidFill>
+                          <a:latin typeface="Arial Black" panose="020B0A04020102020204" pitchFamily="34" charset="0"/>
+                        </a:rPr>
+                        <a:t>1</a:t>
+                      </a:r>
                     </a:p>
                   </a:txBody>
                   <a:tcPr>
@@ -4184,12 +4196,15 @@
                     <a:bodyPr/>
                     <a:lstStyle/>
                     <a:p>
-                      <a:endParaRPr lang="bg-BG" sz="1600" dirty="0">
-                        <a:solidFill>
-                          <a:schemeClr val="tx1"/>
-                        </a:solidFill>
-                        <a:latin typeface="Arial Black" panose="020B0A04020102020204" pitchFamily="34" charset="0"/>
-                      </a:endParaRPr>
+                      <a:r>
+                        <a:rPr lang="bg-BG" sz="1600" dirty="0">
+                          <a:solidFill>
+                            <a:schemeClr val="tx1"/>
+                          </a:solidFill>
+                          <a:latin typeface="Arial Black" panose="020B0A04020102020204" pitchFamily="34" charset="0"/>
+                        </a:rPr>
+                        <a:t>6</a:t>
+                      </a:r>
                     </a:p>
                   </a:txBody>
                   <a:tcPr>
@@ -4237,12 +4252,15 @@
                     <a:bodyPr/>
                     <a:lstStyle/>
                     <a:p>
-                      <a:endParaRPr lang="bg-BG" sz="1600" dirty="0">
-                        <a:solidFill>
-                          <a:schemeClr val="tx1"/>
-                        </a:solidFill>
-                        <a:latin typeface="Arial Black" panose="020B0A04020102020204" pitchFamily="34" charset="0"/>
-                      </a:endParaRPr>
+                      <a:r>
+                        <a:rPr lang="bg-BG" sz="1600" dirty="0">
+                          <a:solidFill>
+                            <a:schemeClr val="tx1"/>
+                          </a:solidFill>
+                          <a:latin typeface="Arial Black" panose="020B0A04020102020204" pitchFamily="34" charset="0"/>
+                        </a:rPr>
+                        <a:t>9</a:t>
+                      </a:r>
                     </a:p>
                   </a:txBody>
                   <a:tcPr>
@@ -4290,12 +4308,15 @@
                     <a:bodyPr/>
                     <a:lstStyle/>
                     <a:p>
-                      <a:endParaRPr lang="bg-BG" sz="1600" dirty="0">
-                        <a:solidFill>
-                          <a:schemeClr val="tx1"/>
-                        </a:solidFill>
-                        <a:latin typeface="Arial Black" panose="020B0A04020102020204" pitchFamily="34" charset="0"/>
-                      </a:endParaRPr>
+                      <a:r>
+                        <a:rPr lang="bg-BG" sz="1600" dirty="0">
+                          <a:solidFill>
+                            <a:schemeClr val="tx1"/>
+                          </a:solidFill>
+                          <a:latin typeface="Arial Black" panose="020B0A04020102020204" pitchFamily="34" charset="0"/>
+                        </a:rPr>
+                        <a:t>2</a:t>
+                      </a:r>
                     </a:p>
                   </a:txBody>
                   <a:tcPr>
@@ -4405,12 +4426,15 @@
                     <a:bodyPr/>
                     <a:lstStyle/>
                     <a:p>
-                      <a:endParaRPr lang="bg-BG" sz="1600" dirty="0">
-                        <a:solidFill>
-                          <a:schemeClr val="tx1"/>
-                        </a:solidFill>
-                        <a:latin typeface="Arial Black" panose="020B0A04020102020204" pitchFamily="34" charset="0"/>
-                      </a:endParaRPr>
+                      <a:r>
+                        <a:rPr lang="bg-BG" sz="1600" dirty="0">
+                          <a:solidFill>
+                            <a:schemeClr val="tx1"/>
+                          </a:solidFill>
+                          <a:latin typeface="Arial Black" panose="020B0A04020102020204" pitchFamily="34" charset="0"/>
+                        </a:rPr>
+                        <a:t>3</a:t>
+                      </a:r>
                     </a:p>
                   </a:txBody>
                   <a:tcPr>
@@ -5186,12 +5210,15 @@
                     <a:bodyPr/>
                     <a:lstStyle/>
                     <a:p>
-                      <a:endParaRPr lang="bg-BG" sz="1600" dirty="0">
-                        <a:solidFill>
-                          <a:schemeClr val="tx1"/>
-                        </a:solidFill>
-                        <a:latin typeface="Arial Black" panose="020B0A04020102020204" pitchFamily="34" charset="0"/>
-                      </a:endParaRPr>
+                      <a:r>
+                        <a:rPr lang="bg-BG" sz="1600" dirty="0">
+                          <a:solidFill>
+                            <a:schemeClr val="tx1"/>
+                          </a:solidFill>
+                          <a:latin typeface="Arial Black" panose="020B0A04020102020204" pitchFamily="34" charset="0"/>
+                        </a:rPr>
+                        <a:t>9</a:t>
+                      </a:r>
                     </a:p>
                   </a:txBody>
                   <a:tcPr>
@@ -5239,12 +5266,15 @@
                     <a:bodyPr/>
                     <a:lstStyle/>
                     <a:p>
-                      <a:endParaRPr lang="bg-BG" sz="1600" dirty="0">
-                        <a:solidFill>
-                          <a:schemeClr val="tx1"/>
-                        </a:solidFill>
-                        <a:latin typeface="Arial Black" panose="020B0A04020102020204" pitchFamily="34" charset="0"/>
-                      </a:endParaRPr>
+                      <a:r>
+                        <a:rPr lang="bg-BG" sz="1600" dirty="0">
+                          <a:solidFill>
+                            <a:schemeClr val="tx1"/>
+                          </a:solidFill>
+                          <a:latin typeface="Arial Black" panose="020B0A04020102020204" pitchFamily="34" charset="0"/>
+                        </a:rPr>
+                        <a:t>1</a:t>
+                      </a:r>
                     </a:p>
                   </a:txBody>
                   <a:tcPr>
@@ -5292,12 +5322,15 @@
                     <a:bodyPr/>
                     <a:lstStyle/>
                     <a:p>
-                      <a:endParaRPr lang="bg-BG" sz="1600" dirty="0">
-                        <a:solidFill>
-                          <a:schemeClr val="tx1"/>
-                        </a:solidFill>
-                        <a:latin typeface="Arial Black" panose="020B0A04020102020204" pitchFamily="34" charset="0"/>
-                      </a:endParaRPr>
+                      <a:r>
+                        <a:rPr lang="bg-BG" sz="1600" dirty="0">
+                          <a:solidFill>
+                            <a:schemeClr val="tx1"/>
+                          </a:solidFill>
+                          <a:latin typeface="Arial Black" panose="020B0A04020102020204" pitchFamily="34" charset="0"/>
+                        </a:rPr>
+                        <a:t>5</a:t>
+                      </a:r>
                     </a:p>
                   </a:txBody>
                   <a:tcPr>
@@ -5701,7 +5734,7 @@
                     <a:lstStyle/>
                     <a:p>
                       <a:r>
-                        <a:rPr lang="bg-BG" sz="1600">
+                        <a:rPr lang="bg-BG" sz="1600" dirty="0">
                           <a:solidFill>
                             <a:schemeClr val="tx1"/>
                           </a:solidFill>
@@ -5709,12 +5742,6 @@
                         </a:rPr>
                         <a:t>3</a:t>
                       </a:r>
-                      <a:endParaRPr lang="bg-BG" sz="1600" dirty="0">
-                        <a:solidFill>
-                          <a:schemeClr val="tx1"/>
-                        </a:solidFill>
-                        <a:latin typeface="Arial Black" panose="020B0A04020102020204" pitchFamily="34" charset="0"/>
-                      </a:endParaRPr>
                     </a:p>
                   </a:txBody>
                   <a:tcPr>
@@ -6303,12 +6330,15 @@
                     <a:bodyPr/>
                     <a:lstStyle/>
                     <a:p>
-                      <a:endParaRPr lang="bg-BG" sz="1600" dirty="0">
-                        <a:solidFill>
-                          <a:schemeClr val="tx1"/>
-                        </a:solidFill>
-                        <a:latin typeface="Arial Black" panose="020B0A04020102020204" pitchFamily="34" charset="0"/>
-                      </a:endParaRPr>
+                      <a:r>
+                        <a:rPr lang="bg-BG" sz="1600" dirty="0">
+                          <a:solidFill>
+                            <a:schemeClr val="tx1"/>
+                          </a:solidFill>
+                          <a:latin typeface="Arial Black" panose="020B0A04020102020204" pitchFamily="34" charset="0"/>
+                        </a:rPr>
+                        <a:t>5</a:t>
+                      </a:r>
                     </a:p>
                   </a:txBody>
                   <a:tcPr>
@@ -6356,12 +6386,15 @@
                     <a:bodyPr/>
                     <a:lstStyle/>
                     <a:p>
-                      <a:endParaRPr lang="bg-BG" sz="1600" dirty="0">
-                        <a:solidFill>
-                          <a:schemeClr val="tx1"/>
-                        </a:solidFill>
-                        <a:latin typeface="Arial Black" panose="020B0A04020102020204" pitchFamily="34" charset="0"/>
-                      </a:endParaRPr>
+                      <a:r>
+                        <a:rPr lang="bg-BG" sz="1600" dirty="0">
+                          <a:solidFill>
+                            <a:schemeClr val="tx1"/>
+                          </a:solidFill>
+                          <a:latin typeface="Arial Black" panose="020B0A04020102020204" pitchFamily="34" charset="0"/>
+                        </a:rPr>
+                        <a:t>3</a:t>
+                      </a:r>
                     </a:p>
                   </a:txBody>
                   <a:tcPr>

</xml_diff>